<commit_message>
socket connections established, simple chat womndow working
</commit_message>
<xml_diff>
--- a/docs/porojectOneBrief.ppt.pptx
+++ b/docs/porojectOneBrief.ppt.pptx
@@ -294,7 +294,7 @@
             <a:fld id="{87DE6118-2437-4B30-8E3C-4D2BE6020583}" type="datetimeFigureOut">
               <a:rPr lang="en-US" dirty="0"/>
               <a:pPr/>
-              <a:t>1/17/20</a:t>
+              <a:t>1/18/20</a:t>
             </a:fld>
             <a:endParaRPr lang="en-US" dirty="0"/>
           </a:p>
@@ -620,7 +620,7 @@
           <a:p>
             <a:fld id="{87DE6118-2437-4B30-8E3C-4D2BE6020583}" type="datetimeFigureOut">
               <a:rPr lang="en-US" dirty="0"/>
-              <a:t>1/17/20</a:t>
+              <a:t>1/18/20</a:t>
             </a:fld>
             <a:endParaRPr lang="en-US" dirty="0"/>
           </a:p>
@@ -795,7 +795,7 @@
           <a:p>
             <a:fld id="{87DE6118-2437-4B30-8E3C-4D2BE6020583}" type="datetimeFigureOut">
               <a:rPr lang="en-US" dirty="0"/>
-              <a:t>1/17/20</a:t>
+              <a:t>1/18/20</a:t>
             </a:fld>
             <a:endParaRPr lang="en-US" dirty="0"/>
           </a:p>
@@ -960,7 +960,7 @@
           <a:p>
             <a:fld id="{87DE6118-2437-4B30-8E3C-4D2BE6020583}" type="datetimeFigureOut">
               <a:rPr lang="en-US" dirty="0"/>
-              <a:t>1/17/20</a:t>
+              <a:t>1/18/20</a:t>
             </a:fld>
             <a:endParaRPr lang="en-US" dirty="0"/>
           </a:p>
@@ -1233,7 +1233,7 @@
             <a:fld id="{87DE6118-2437-4B30-8E3C-4D2BE6020583}" type="datetimeFigureOut">
               <a:rPr lang="en-US" dirty="0"/>
               <a:pPr/>
-              <a:t>1/17/20</a:t>
+              <a:t>1/18/20</a:t>
             </a:fld>
             <a:endParaRPr lang="en-US" dirty="0"/>
           </a:p>
@@ -1623,7 +1623,7 @@
           <a:p>
             <a:fld id="{87DE6118-2437-4B30-8E3C-4D2BE6020583}" type="datetimeFigureOut">
               <a:rPr lang="en-US" dirty="0"/>
-              <a:t>1/17/20</a:t>
+              <a:t>1/18/20</a:t>
             </a:fld>
             <a:endParaRPr lang="en-US" dirty="0"/>
           </a:p>
@@ -2095,7 +2095,7 @@
           <a:p>
             <a:fld id="{87DE6118-2437-4B30-8E3C-4D2BE6020583}" type="datetimeFigureOut">
               <a:rPr lang="en-US" dirty="0"/>
-              <a:t>1/17/20</a:t>
+              <a:t>1/18/20</a:t>
             </a:fld>
             <a:endParaRPr lang="en-US" dirty="0"/>
           </a:p>
@@ -2208,7 +2208,7 @@
           <a:p>
             <a:fld id="{87DE6118-2437-4B30-8E3C-4D2BE6020583}" type="datetimeFigureOut">
               <a:rPr lang="en-US" dirty="0"/>
-              <a:t>1/17/20</a:t>
+              <a:t>1/18/20</a:t>
             </a:fld>
             <a:endParaRPr lang="en-US" dirty="0"/>
           </a:p>
@@ -2298,7 +2298,7 @@
           <a:p>
             <a:fld id="{87DE6118-2437-4B30-8E3C-4D2BE6020583}" type="datetimeFigureOut">
               <a:rPr lang="en-US" dirty="0"/>
-              <a:t>1/17/20</a:t>
+              <a:t>1/18/20</a:t>
             </a:fld>
             <a:endParaRPr lang="en-US" dirty="0"/>
           </a:p>
@@ -2640,7 +2640,7 @@
             <a:fld id="{87DE6118-2437-4B30-8E3C-4D2BE6020583}" type="datetimeFigureOut">
               <a:rPr lang="en-US" dirty="0"/>
               <a:pPr/>
-              <a:t>1/17/20</a:t>
+              <a:t>1/18/20</a:t>
             </a:fld>
             <a:endParaRPr lang="en-US" dirty="0"/>
           </a:p>
@@ -3025,7 +3025,7 @@
             <a:fld id="{87DE6118-2437-4B30-8E3C-4D2BE6020583}" type="datetimeFigureOut">
               <a:rPr lang="en-US" dirty="0"/>
               <a:pPr/>
-              <a:t>1/17/20</a:t>
+              <a:t>1/18/20</a:t>
             </a:fld>
             <a:endParaRPr lang="en-US" dirty="0"/>
           </a:p>
@@ -3300,7 +3300,7 @@
             <a:fld id="{87DE6118-2437-4B30-8E3C-4D2BE6020583}" type="datetimeFigureOut">
               <a:rPr lang="en-US" dirty="0"/>
               <a:pPr/>
-              <a:t>1/17/20</a:t>
+              <a:t>1/18/20</a:t>
             </a:fld>
             <a:endParaRPr lang="en-US" dirty="0"/>
           </a:p>
@@ -4384,6 +4384,16 @@
               <a:buNone/>
             </a:pPr>
             <a:r>
+              <a:rPr lang="en-US" dirty="0" err="1"/>
+              <a:t>Nodemon</a:t>
+            </a:r>
+            <a:endParaRPr lang="en-US" dirty="0"/>
+          </a:p>
+          <a:p>
+            <a:pPr marL="0" indent="0">
+              <a:buNone/>
+            </a:pPr>
+            <a:r>
               <a:rPr lang="en-US" dirty="0"/>
               <a:t>Express</a:t>
             </a:r>
@@ -4487,7 +4497,7 @@
           <a:p>
             <a:r>
               <a:rPr lang="en-US" dirty="0"/>
-              <a:t>Game Flow:</a:t>
+              <a:t>Control/Data Flow:</a:t>
             </a:r>
             <a:br>
               <a:rPr lang="en-US" dirty="0"/>

</xml_diff>